<commit_message>
Changed web extension to chat extension
</commit_message>
<xml_diff>
--- a/promo/presentation.pptx
+++ b/promo/presentation.pptx
@@ -129,6 +129,30 @@
 
 <file path=ppt/changesInfos/changesInfo1.xml><?xml version="1.0" encoding="utf-8"?>
 <pc:chgInfo xmlns:a="http://schemas.openxmlformats.org/drawingml/2006/main" xmlns:r="http://schemas.openxmlformats.org/officeDocument/2006/relationships" xmlns:ac="http://schemas.microsoft.com/office/drawing/2013/main/command" xmlns:pc="http://schemas.microsoft.com/office/powerpoint/2013/main/command">
+  <pc:docChgLst>
+    <pc:chgData name="Gabriel Ng" userId="aa9fd509d867c2ff" providerId="LiveId" clId="{214C61EA-D792-43DE-8657-21AA9EBB49EC}"/>
+    <pc:docChg chg="modSld">
+      <pc:chgData name="Gabriel Ng" userId="aa9fd509d867c2ff" providerId="LiveId" clId="{214C61EA-D792-43DE-8657-21AA9EBB49EC}" dt="2019-12-08T17:15:02.508" v="6" actId="20577"/>
+      <pc:docMkLst>
+        <pc:docMk/>
+      </pc:docMkLst>
+      <pc:sldChg chg="modSp">
+        <pc:chgData name="Gabriel Ng" userId="aa9fd509d867c2ff" providerId="LiveId" clId="{214C61EA-D792-43DE-8657-21AA9EBB49EC}" dt="2019-12-08T17:15:02.508" v="6" actId="20577"/>
+        <pc:sldMkLst>
+          <pc:docMk/>
+          <pc:sldMk cId="1887820237" sldId="260"/>
+        </pc:sldMkLst>
+        <pc:spChg chg="mod">
+          <ac:chgData name="Gabriel Ng" userId="aa9fd509d867c2ff" providerId="LiveId" clId="{214C61EA-D792-43DE-8657-21AA9EBB49EC}" dt="2019-12-08T17:15:02.508" v="6" actId="20577"/>
+          <ac:spMkLst>
+            <pc:docMk/>
+            <pc:sldMk cId="1887820237" sldId="260"/>
+            <ac:spMk id="51" creationId="{D8145AB6-9100-4C42-9DA7-626ED0949BBE}"/>
+          </ac:spMkLst>
+        </pc:spChg>
+      </pc:sldChg>
+    </pc:docChg>
+  </pc:docChgLst>
   <pc:docChgLst>
     <pc:chgData name="Gabriel Ng" userId="aa9fd509d867c2ff" providerId="LiveId" clId="{C4B2F221-1D1A-42E5-BA45-ED02B881FCF5}"/>
     <pc:docChg chg="undo custSel mod modSld">
@@ -6448,7 +6472,7 @@
               </a:pPr>
               <a:r>
                 <a:rPr lang="en" dirty="0"/>
-                <a:t>Web extension</a:t>
+                <a:t>Chat extension</a:t>
               </a:r>
               <a:endParaRPr dirty="0"/>
             </a:p>
@@ -7877,12 +7901,9 @@
 </file>
 
 <file path=customXml/item1.xml><?xml version="1.0" encoding="utf-8"?>
-<?mso-contentType ?>
-<FormTemplates xmlns="http://schemas.microsoft.com/sharepoint/v3/contenttype/forms">
-  <Display>DocumentLibraryForm</Display>
-  <Edit>DocumentLibraryForm</Edit>
-  <New>DocumentLibraryForm</New>
-</FormTemplates>
+<p:properties xmlns:p="http://schemas.microsoft.com/office/2006/metadata/properties" xmlns:xsi="http://www.w3.org/2001/XMLSchema-instance" xmlns:pc="http://schemas.microsoft.com/office/infopath/2007/PartnerControls">
+  <documentManagement/>
+</p:properties>
 </file>
 
 <file path=customXml/item2.xml><?xml version="1.0" encoding="utf-8"?>
@@ -8018,15 +8039,19 @@
 </file>
 
 <file path=customXml/item3.xml><?xml version="1.0" encoding="utf-8"?>
-<p:properties xmlns:p="http://schemas.microsoft.com/office/2006/metadata/properties" xmlns:xsi="http://www.w3.org/2001/XMLSchema-instance" xmlns:pc="http://schemas.microsoft.com/office/infopath/2007/PartnerControls">
-  <documentManagement/>
-</p:properties>
+<?mso-contentType ?>
+<FormTemplates xmlns="http://schemas.microsoft.com/sharepoint/v3/contenttype/forms">
+  <Display>DocumentLibraryForm</Display>
+  <Edit>DocumentLibraryForm</Edit>
+  <New>DocumentLibraryForm</New>
+</FormTemplates>
 </file>
 
 <file path=customXml/itemProps1.xml><?xml version="1.0" encoding="utf-8"?>
-<ds:datastoreItem xmlns:ds="http://schemas.openxmlformats.org/officeDocument/2006/customXml" ds:itemID="{5E0B0DA8-D6CD-4DCE-B537-41D983C0EE34}">
+<ds:datastoreItem xmlns:ds="http://schemas.openxmlformats.org/officeDocument/2006/customXml" ds:itemID="{A6050DCD-EB4A-4BE1-AF05-D12EB61D7B26}">
   <ds:schemaRefs>
-    <ds:schemaRef ds:uri="http://schemas.microsoft.com/sharepoint/v3/contenttype/forms"/>
+    <ds:schemaRef ds:uri="http://schemas.microsoft.com/office/2006/metadata/properties"/>
+    <ds:schemaRef ds:uri="http://schemas.microsoft.com/office/infopath/2007/PartnerControls"/>
   </ds:schemaRefs>
 </ds:datastoreItem>
 </file>
@@ -8050,17 +8075,9 @@
 </file>
 
 <file path=customXml/itemProps3.xml><?xml version="1.0" encoding="utf-8"?>
-<ds:datastoreItem xmlns:ds="http://schemas.openxmlformats.org/officeDocument/2006/customXml" ds:itemID="{A6050DCD-EB4A-4BE1-AF05-D12EB61D7B26}">
+<ds:datastoreItem xmlns:ds="http://schemas.openxmlformats.org/officeDocument/2006/customXml" ds:itemID="{5E0B0DA8-D6CD-4DCE-B537-41D983C0EE34}">
   <ds:schemaRefs>
-    <ds:schemaRef ds:uri="3bcbc673-fa04-45e4-9d75-a434fb9e42d4"/>
-    <ds:schemaRef ds:uri="http://purl.org/dc/dcmitype/"/>
-    <ds:schemaRef ds:uri="http://purl.org/dc/elements/1.1/"/>
-    <ds:schemaRef ds:uri="http://schemas.microsoft.com/office/2006/documentManagement/types"/>
-    <ds:schemaRef ds:uri="http://purl.org/dc/terms/"/>
-    <ds:schemaRef ds:uri="http://schemas.microsoft.com/office/infopath/2007/PartnerControls"/>
-    <ds:schemaRef ds:uri="http://www.w3.org/XML/1998/namespace"/>
-    <ds:schemaRef ds:uri="http://schemas.openxmlformats.org/package/2006/metadata/core-properties"/>
-    <ds:schemaRef ds:uri="http://schemas.microsoft.com/office/2006/metadata/properties"/>
+    <ds:schemaRef ds:uri="http://schemas.microsoft.com/sharepoint/v3/contenttype/forms"/>
   </ds:schemaRefs>
 </ds:datastoreItem>
 </file>
</xml_diff>

<commit_message>
Update architecture image; Add YouTube demo link to ppt
</commit_message>
<xml_diff>
--- a/promo/presentation.pptx
+++ b/promo/presentation.pptx
@@ -4974,7 +4974,7 @@
           <p:nvPr/>
         </p:nvPicPr>
         <p:blipFill>
-          <a:blip r:embed="rId8">
+          <a:blip r:embed="rId8" cstate="print">
             <a:extLst>
               <a:ext uri="{28A0092B-C50C-407E-A947-70E740481C1C}">
                 <a14:useLocalDpi xmlns:a14="http://schemas.microsoft.com/office/drawing/2010/main" val="0"/>
@@ -5268,7 +5268,7 @@
           <p:nvPr/>
         </p:nvPicPr>
         <p:blipFill rotWithShape="1">
-          <a:blip r:embed="rId3">
+          <a:blip r:embed="rId4">
             <a:extLst>
               <a:ext uri="{28A0092B-C50C-407E-A947-70E740481C1C}">
                 <a14:useLocalDpi xmlns:a14="http://schemas.microsoft.com/office/drawing/2010/main" val="0"/>
@@ -5298,7 +5298,7 @@
         </p:nvSpPr>
         <p:spPr>
           <a:xfrm>
-            <a:off x="753670" y="1876025"/>
+            <a:off x="991851" y="354652"/>
             <a:ext cx="3092189" cy="747943"/>
           </a:xfrm>
           <a:prstGeom prst="rect">
@@ -5705,7 +5705,7 @@
         </p:nvCxnSpPr>
         <p:spPr>
           <a:xfrm>
-            <a:off x="821864" y="2676503"/>
+            <a:off x="1058347" y="1154139"/>
             <a:ext cx="2302336" cy="0"/>
           </a:xfrm>
           <a:prstGeom prst="line">
@@ -5749,7 +5749,7 @@
           <p:nvPr/>
         </p:nvPicPr>
         <p:blipFill>
-          <a:blip r:embed="rId4">
+          <a:blip r:embed="rId5" cstate="print">
             <a:extLst>
               <a:ext uri="{28A0092B-C50C-407E-A947-70E740481C1C}">
                 <a14:useLocalDpi xmlns:a14="http://schemas.microsoft.com/office/drawing/2010/main" val="0"/>
@@ -5781,6 +5781,76 @@
           </a:extLst>
         </p:spPr>
       </p:pic>
+      <p:pic>
+        <p:nvPicPr>
+          <p:cNvPr id="2" name="Online Media 1" title="Facebook Hackathon Dec 2019 - Team16: Kaiwa Sensei">
+            <a:hlinkClick r:id="" action="ppaction://media"/>
+            <a:extLst>
+              <a:ext uri="{FF2B5EF4-FFF2-40B4-BE49-F238E27FC236}">
+                <a16:creationId xmlns:a16="http://schemas.microsoft.com/office/drawing/2014/main" id="{152D88B2-FA7C-4A1C-9E67-A5535B80BAF6}"/>
+              </a:ext>
+            </a:extLst>
+          </p:cNvPr>
+          <p:cNvPicPr>
+            <a:picLocks noRot="1" noChangeAspect="1"/>
+          </p:cNvPicPr>
+          <p:nvPr>
+            <a:videoFile r:link="rId1"/>
+          </p:nvPr>
+        </p:nvPicPr>
+        <p:blipFill>
+          <a:blip r:embed="rId6"/>
+          <a:stretch>
+            <a:fillRect/>
+          </a:stretch>
+        </p:blipFill>
+        <p:spPr>
+          <a:xfrm>
+            <a:off x="313997" y="2167759"/>
+            <a:ext cx="5305542" cy="3976267"/>
+          </a:xfrm>
+          <a:prstGeom prst="rect">
+            <a:avLst/>
+          </a:prstGeom>
+        </p:spPr>
+      </p:pic>
+      <p:sp>
+        <p:nvSpPr>
+          <p:cNvPr id="4" name="Rectangle 3">
+            <a:extLst>
+              <a:ext uri="{FF2B5EF4-FFF2-40B4-BE49-F238E27FC236}">
+                <a16:creationId xmlns:a16="http://schemas.microsoft.com/office/drawing/2014/main" id="{6A49E0A3-9DA8-4F1F-ABC6-5DC0921B03D2}"/>
+              </a:ext>
+            </a:extLst>
+          </p:cNvPr>
+          <p:cNvSpPr/>
+          <p:nvPr/>
+        </p:nvSpPr>
+        <p:spPr>
+          <a:xfrm>
+            <a:off x="8891588" y="76133"/>
+            <a:ext cx="3032561" cy="369332"/>
+          </a:xfrm>
+          <a:prstGeom prst="rect">
+            <a:avLst/>
+          </a:prstGeom>
+        </p:spPr>
+        <p:txBody>
+          <a:bodyPr wrap="none">
+            <a:spAutoFit/>
+          </a:bodyPr>
+          <a:lstStyle/>
+          <a:p>
+            <a:r>
+              <a:rPr lang="en-GB" dirty="0">
+                <a:hlinkClick r:id="rId7"/>
+              </a:rPr>
+              <a:t>https://youtu.be/gtSHrm3yi8Y</a:t>
+            </a:r>
+            <a:endParaRPr lang="en-GB" dirty="0"/>
+          </a:p>
+        </p:txBody>
+      </p:sp>
     </p:spTree>
     <p:extLst>
       <p:ext uri="{BB962C8B-B14F-4D97-AF65-F5344CB8AC3E}">
@@ -5791,6 +5861,141 @@
   <p:clrMapOvr>
     <a:masterClrMapping/>
   </p:clrMapOvr>
+  <p:timing>
+    <p:tnLst>
+      <p:par>
+        <p:cTn id="1" dur="indefinite" restart="never" nodeType="tmRoot">
+          <p:childTnLst>
+            <p:seq concurrent="1" nextAc="seek">
+              <p:cTn id="2" dur="indefinite" nodeType="mainSeq">
+                <p:childTnLst>
+                  <p:par>
+                    <p:cTn id="3" fill="hold">
+                      <p:stCondLst>
+                        <p:cond delay="indefinite"/>
+                      </p:stCondLst>
+                      <p:childTnLst>
+                        <p:par>
+                          <p:cTn id="4" fill="hold">
+                            <p:stCondLst>
+                              <p:cond delay="0"/>
+                            </p:stCondLst>
+                            <p:childTnLst>
+                              <p:par>
+                                <p:cTn id="5" presetID="1" presetClass="mediacall" presetSubtype="0" fill="hold" nodeType="clickEffect">
+                                  <p:stCondLst>
+                                    <p:cond delay="0"/>
+                                  </p:stCondLst>
+                                  <p:childTnLst>
+                                    <p:cmd type="call" cmd="playFrom(0.0)">
+                                      <p:cBhvr>
+                                        <p:cTn id="6" dur="1" fill="hold"/>
+                                        <p:tgtEl>
+                                          <p:spTgt spid="2"/>
+                                        </p:tgtEl>
+                                      </p:cBhvr>
+                                    </p:cmd>
+                                  </p:childTnLst>
+                                </p:cTn>
+                              </p:par>
+                            </p:childTnLst>
+                          </p:cTn>
+                        </p:par>
+                      </p:childTnLst>
+                    </p:cTn>
+                  </p:par>
+                </p:childTnLst>
+              </p:cTn>
+              <p:prevCondLst>
+                <p:cond evt="onPrev" delay="0">
+                  <p:tgtEl>
+                    <p:sldTgt/>
+                  </p:tgtEl>
+                </p:cond>
+              </p:prevCondLst>
+              <p:nextCondLst>
+                <p:cond evt="onNext" delay="0">
+                  <p:tgtEl>
+                    <p:sldTgt/>
+                  </p:tgtEl>
+                </p:cond>
+              </p:nextCondLst>
+            </p:seq>
+            <p:video>
+              <p:cMediaNode vol="80000">
+                <p:cTn id="7" fill="hold" display="0">
+                  <p:stCondLst>
+                    <p:cond delay="indefinite"/>
+                  </p:stCondLst>
+                </p:cTn>
+                <p:tgtEl>
+                  <p:spTgt spid="2"/>
+                </p:tgtEl>
+              </p:cMediaNode>
+            </p:video>
+            <p:seq concurrent="1" nextAc="seek">
+              <p:cTn id="8" restart="whenNotActive" fill="hold" evtFilter="cancelBubble" nodeType="interactiveSeq">
+                <p:stCondLst>
+                  <p:cond evt="onClick" delay="0">
+                    <p:tgtEl>
+                      <p:spTgt spid="2"/>
+                    </p:tgtEl>
+                  </p:cond>
+                </p:stCondLst>
+                <p:endSync evt="end" delay="0">
+                  <p:rtn val="all"/>
+                </p:endSync>
+                <p:childTnLst>
+                  <p:par>
+                    <p:cTn id="9" fill="hold">
+                      <p:stCondLst>
+                        <p:cond delay="0"/>
+                      </p:stCondLst>
+                      <p:childTnLst>
+                        <p:par>
+                          <p:cTn id="10" fill="hold">
+                            <p:stCondLst>
+                              <p:cond delay="0"/>
+                            </p:stCondLst>
+                            <p:childTnLst>
+                              <p:par>
+                                <p:cTn id="11" presetID="2" presetClass="mediacall" presetSubtype="0" fill="hold" nodeType="clickEffect">
+                                  <p:stCondLst>
+                                    <p:cond delay="0"/>
+                                  </p:stCondLst>
+                                  <p:childTnLst>
+                                    <p:cmd type="call" cmd="togglePause">
+                                      <p:cBhvr>
+                                        <p:cTn id="12" dur="1" fill="hold"/>
+                                        <p:tgtEl>
+                                          <p:spTgt spid="2"/>
+                                        </p:tgtEl>
+                                      </p:cBhvr>
+                                    </p:cmd>
+                                  </p:childTnLst>
+                                </p:cTn>
+                              </p:par>
+                            </p:childTnLst>
+                          </p:cTn>
+                        </p:par>
+                      </p:childTnLst>
+                    </p:cTn>
+                  </p:par>
+                </p:childTnLst>
+              </p:cTn>
+              <p:nextCondLst>
+                <p:cond evt="onClick" delay="0">
+                  <p:tgtEl>
+                    <p:spTgt spid="2"/>
+                  </p:tgtEl>
+                </p:cond>
+              </p:nextCondLst>
+            </p:seq>
+          </p:childTnLst>
+        </p:cTn>
+      </p:par>
+    </p:tnLst>
+  </p:timing>
 </p:sld>
 </file>
 
@@ -5811,36 +6016,6 @@
           <a:chExt cx="0" cy="0"/>
         </a:xfrm>
       </p:grpSpPr>
-      <p:pic>
-        <p:nvPicPr>
-          <p:cNvPr id="55" name="Picture 54">
-            <a:extLst>
-              <a:ext uri="{FF2B5EF4-FFF2-40B4-BE49-F238E27FC236}">
-                <a16:creationId xmlns:a16="http://schemas.microsoft.com/office/drawing/2014/main" id="{CAEC143E-EBAE-4DD5-8642-25A7CE11C870}"/>
-              </a:ext>
-            </a:extLst>
-          </p:cNvPr>
-          <p:cNvPicPr>
-            <a:picLocks noChangeAspect="1"/>
-          </p:cNvPicPr>
-          <p:nvPr/>
-        </p:nvPicPr>
-        <p:blipFill>
-          <a:blip r:embed="rId2"/>
-          <a:stretch>
-            <a:fillRect/>
-          </a:stretch>
-        </p:blipFill>
-        <p:spPr>
-          <a:xfrm>
-            <a:off x="4161832" y="2644001"/>
-            <a:ext cx="1413445" cy="2283746"/>
-          </a:xfrm>
-          <a:prstGeom prst="rect">
-            <a:avLst/>
-          </a:prstGeom>
-        </p:spPr>
-      </p:pic>
       <p:sp>
         <p:nvSpPr>
           <p:cNvPr id="27" name="Rectangle 26">
@@ -5948,7 +6123,7 @@
           <p:nvPr/>
         </p:nvPicPr>
         <p:blipFill>
-          <a:blip r:embed="rId3">
+          <a:blip r:embed="rId2" cstate="print">
             <a:extLst>
               <a:ext uri="{28A0092B-C50C-407E-A947-70E740481C1C}">
                 <a14:useLocalDpi xmlns:a14="http://schemas.microsoft.com/office/drawing/2010/main" val="0"/>
@@ -5982,10 +6157,10 @@
       </p:pic>
       <p:grpSp>
         <p:nvGrpSpPr>
-          <p:cNvPr id="38" name="Group 37">
+          <p:cNvPr id="3" name="Group 2">
             <a:extLst>
               <a:ext uri="{FF2B5EF4-FFF2-40B4-BE49-F238E27FC236}">
-                <a16:creationId xmlns:a16="http://schemas.microsoft.com/office/drawing/2014/main" id="{74033C13-F521-4D0A-B396-B65E0186DC0E}"/>
+                <a16:creationId xmlns:a16="http://schemas.microsoft.com/office/drawing/2014/main" id="{6A813868-096C-4ADA-B57B-6D395AEA9A74}"/>
               </a:ext>
             </a:extLst>
           </p:cNvPr>
@@ -5996,97 +6171,46 @@
           <a:xfrm>
             <a:off x="890930" y="2214310"/>
             <a:ext cx="10445937" cy="3281251"/>
-            <a:chOff x="629083" y="2477930"/>
-            <a:chExt cx="9538657" cy="2916031"/>
+            <a:chOff x="890930" y="2214310"/>
+            <a:chExt cx="10445937" cy="3281251"/>
           </a:xfrm>
         </p:grpSpPr>
         <p:pic>
           <p:nvPicPr>
-            <p:cNvPr id="39" name="Google Shape;68;p15">
+            <p:cNvPr id="55" name="Picture 54">
               <a:extLst>
                 <a:ext uri="{FF2B5EF4-FFF2-40B4-BE49-F238E27FC236}">
-                  <a16:creationId xmlns:a16="http://schemas.microsoft.com/office/drawing/2014/main" id="{043A86BD-298D-409D-AFD0-4FF4F6C72394}"/>
+                  <a16:creationId xmlns:a16="http://schemas.microsoft.com/office/drawing/2014/main" id="{CAEC143E-EBAE-4DD5-8642-25A7CE11C870}"/>
                 </a:ext>
               </a:extLst>
             </p:cNvPr>
-            <p:cNvPicPr preferRelativeResize="0"/>
+            <p:cNvPicPr>
+              <a:picLocks noChangeAspect="1"/>
+            </p:cNvPicPr>
             <p:nvPr/>
           </p:nvPicPr>
-          <p:blipFill rotWithShape="1">
-            <a:blip r:embed="rId4">
-              <a:alphaModFix/>
-            </a:blip>
-            <a:srcRect l="30926" r="34382"/>
-            <a:stretch/>
+          <p:blipFill>
+            <a:blip r:embed="rId3"/>
+            <a:stretch>
+              <a:fillRect/>
+            </a:stretch>
           </p:blipFill>
           <p:spPr>
             <a:xfrm>
-              <a:off x="6388999" y="2894667"/>
-              <a:ext cx="1532467" cy="1656500"/>
+              <a:off x="4161832" y="2644001"/>
+              <a:ext cx="1413445" cy="2283746"/>
             </a:xfrm>
             <a:prstGeom prst="rect">
               <a:avLst/>
             </a:prstGeom>
-            <a:noFill/>
-            <a:ln>
-              <a:noFill/>
-            </a:ln>
           </p:spPr>
         </p:pic>
-        <p:sp>
-          <p:nvSpPr>
-            <p:cNvPr id="40" name="Google Shape;69;p15">
+        <p:grpSp>
+          <p:nvGrpSpPr>
+            <p:cNvPr id="38" name="Group 37">
               <a:extLst>
                 <a:ext uri="{FF2B5EF4-FFF2-40B4-BE49-F238E27FC236}">
-                  <a16:creationId xmlns:a16="http://schemas.microsoft.com/office/drawing/2014/main" id="{1CFD5115-9964-47B7-9881-8A3E4B89EDE3}"/>
-                </a:ext>
-              </a:extLst>
-            </p:cNvPr>
-            <p:cNvSpPr txBox="1"/>
-            <p:nvPr/>
-          </p:nvSpPr>
-          <p:spPr>
-            <a:xfrm>
-              <a:off x="6463732" y="3846216"/>
-              <a:ext cx="1383000" cy="395400"/>
-            </a:xfrm>
-            <a:prstGeom prst="rect">
-              <a:avLst/>
-            </a:prstGeom>
-            <a:noFill/>
-            <a:ln>
-              <a:noFill/>
-            </a:ln>
-          </p:spPr>
-          <p:txBody>
-            <a:bodyPr spcFirstLastPara="1" wrap="square" lIns="91425" tIns="91425" rIns="91425" bIns="91425" anchor="t" anchorCtr="0">
-              <a:noAutofit/>
-            </a:bodyPr>
-            <a:lstStyle/>
-            <a:p>
-              <a:pPr marL="0" lvl="0" indent="0" algn="ctr" rtl="0">
-                <a:spcBef>
-                  <a:spcPts val="0"/>
-                </a:spcBef>
-                <a:spcAft>
-                  <a:spcPts val="0"/>
-                </a:spcAft>
-                <a:buNone/>
-              </a:pPr>
-              <a:r>
-                <a:rPr lang="en" dirty="0"/>
-                <a:t>Chat Server</a:t>
-              </a:r>
-              <a:endParaRPr dirty="0"/>
-            </a:p>
-          </p:txBody>
-        </p:sp>
-        <p:grpSp>
-          <p:nvGrpSpPr>
-            <p:cNvPr id="36" name="Group 35">
-              <a:extLst>
-                <a:ext uri="{FF2B5EF4-FFF2-40B4-BE49-F238E27FC236}">
-                  <a16:creationId xmlns:a16="http://schemas.microsoft.com/office/drawing/2014/main" id="{CFBAE6F2-47C1-48BC-8F52-4702D0B23337}"/>
+                  <a16:creationId xmlns:a16="http://schemas.microsoft.com/office/drawing/2014/main" id="{74033C13-F521-4D0A-B396-B65E0186DC0E}"/>
                 </a:ext>
               </a:extLst>
             </p:cNvPr>
@@ -6095,36 +6219,35 @@
           </p:nvGrpSpPr>
           <p:grpSpPr>
             <a:xfrm>
-              <a:off x="5886082" y="4480511"/>
-              <a:ext cx="2538300" cy="913450"/>
-              <a:chOff x="8692224" y="4631166"/>
-              <a:chExt cx="2538300" cy="913450"/>
+              <a:off x="890930" y="2214310"/>
+              <a:ext cx="10445937" cy="3281251"/>
+              <a:chOff x="629083" y="2477930"/>
+              <a:chExt cx="9538657" cy="2916031"/>
             </a:xfrm>
           </p:grpSpPr>
           <p:pic>
             <p:nvPicPr>
-              <p:cNvPr id="41" name="Google Shape;70;p15">
+              <p:cNvPr id="39" name="Google Shape;68;p15">
                 <a:extLst>
                   <a:ext uri="{FF2B5EF4-FFF2-40B4-BE49-F238E27FC236}">
-                    <a16:creationId xmlns:a16="http://schemas.microsoft.com/office/drawing/2014/main" id="{CB870972-E5B3-4F75-944D-422F80DF8A71}"/>
+                    <a16:creationId xmlns:a16="http://schemas.microsoft.com/office/drawing/2014/main" id="{043A86BD-298D-409D-AFD0-4FF4F6C72394}"/>
                   </a:ext>
                 </a:extLst>
               </p:cNvPr>
               <p:cNvPicPr preferRelativeResize="0"/>
               <p:nvPr/>
             </p:nvPicPr>
-            <p:blipFill>
-              <a:blip r:embed="rId5">
+            <p:blipFill rotWithShape="1">
+              <a:blip r:embed="rId4">
                 <a:alphaModFix/>
               </a:blip>
-              <a:stretch>
-                <a:fillRect/>
-              </a:stretch>
+              <a:srcRect l="30926" r="34382"/>
+              <a:stretch/>
             </p:blipFill>
             <p:spPr>
               <a:xfrm>
-                <a:off x="8692224" y="4631166"/>
-                <a:ext cx="913450" cy="913450"/>
+                <a:off x="6388999" y="2894667"/>
+                <a:ext cx="1532467" cy="1656500"/>
               </a:xfrm>
               <a:prstGeom prst="rect">
                 <a:avLst/>
@@ -6137,10 +6260,10 @@
           </p:pic>
           <p:sp>
             <p:nvSpPr>
-              <p:cNvPr id="42" name="Google Shape;71;p15">
+              <p:cNvPr id="40" name="Google Shape;69;p15">
                 <a:extLst>
                   <a:ext uri="{FF2B5EF4-FFF2-40B4-BE49-F238E27FC236}">
-                    <a16:creationId xmlns:a16="http://schemas.microsoft.com/office/drawing/2014/main" id="{4BC7F1DD-F931-4AEF-95CF-ACC57C42538D}"/>
+                    <a16:creationId xmlns:a16="http://schemas.microsoft.com/office/drawing/2014/main" id="{1CFD5115-9964-47B7-9881-8A3E4B89EDE3}"/>
                   </a:ext>
                 </a:extLst>
               </p:cNvPr>
@@ -6149,8 +6272,323 @@
             </p:nvSpPr>
             <p:spPr>
               <a:xfrm>
-                <a:off x="9479724" y="4935316"/>
-                <a:ext cx="1750800" cy="395400"/>
+                <a:off x="6463732" y="3846216"/>
+                <a:ext cx="1383000" cy="395400"/>
+              </a:xfrm>
+              <a:prstGeom prst="rect">
+                <a:avLst/>
+              </a:prstGeom>
+              <a:noFill/>
+              <a:ln>
+                <a:noFill/>
+              </a:ln>
+            </p:spPr>
+            <p:txBody>
+              <a:bodyPr spcFirstLastPara="1" wrap="square" lIns="91425" tIns="91425" rIns="91425" bIns="91425" anchor="t" anchorCtr="0">
+                <a:noAutofit/>
+              </a:bodyPr>
+              <a:lstStyle/>
+              <a:p>
+                <a:pPr marL="0" lvl="0" indent="0" algn="ctr" rtl="0">
+                  <a:spcBef>
+                    <a:spcPts val="0"/>
+                  </a:spcBef>
+                  <a:spcAft>
+                    <a:spcPts val="0"/>
+                  </a:spcAft>
+                  <a:buNone/>
+                </a:pPr>
+                <a:r>
+                  <a:rPr lang="en" dirty="0"/>
+                  <a:t>Chat Server</a:t>
+                </a:r>
+                <a:endParaRPr dirty="0"/>
+              </a:p>
+            </p:txBody>
+          </p:sp>
+          <p:grpSp>
+            <p:nvGrpSpPr>
+              <p:cNvPr id="36" name="Group 35">
+                <a:extLst>
+                  <a:ext uri="{FF2B5EF4-FFF2-40B4-BE49-F238E27FC236}">
+                    <a16:creationId xmlns:a16="http://schemas.microsoft.com/office/drawing/2014/main" id="{CFBAE6F2-47C1-48BC-8F52-4702D0B23337}"/>
+                  </a:ext>
+                </a:extLst>
+              </p:cNvPr>
+              <p:cNvGrpSpPr/>
+              <p:nvPr/>
+            </p:nvGrpSpPr>
+            <p:grpSpPr>
+              <a:xfrm>
+                <a:off x="5886082" y="4480511"/>
+                <a:ext cx="2538300" cy="913450"/>
+                <a:chOff x="8692224" y="4631166"/>
+                <a:chExt cx="2538300" cy="913450"/>
+              </a:xfrm>
+            </p:grpSpPr>
+            <p:pic>
+              <p:nvPicPr>
+                <p:cNvPr id="41" name="Google Shape;70;p15">
+                  <a:extLst>
+                    <a:ext uri="{FF2B5EF4-FFF2-40B4-BE49-F238E27FC236}">
+                      <a16:creationId xmlns:a16="http://schemas.microsoft.com/office/drawing/2014/main" id="{CB870972-E5B3-4F75-944D-422F80DF8A71}"/>
+                    </a:ext>
+                  </a:extLst>
+                </p:cNvPr>
+                <p:cNvPicPr preferRelativeResize="0"/>
+                <p:nvPr/>
+              </p:nvPicPr>
+              <p:blipFill>
+                <a:blip r:embed="rId5">
+                  <a:alphaModFix/>
+                </a:blip>
+                <a:stretch>
+                  <a:fillRect/>
+                </a:stretch>
+              </p:blipFill>
+              <p:spPr>
+                <a:xfrm>
+                  <a:off x="8692224" y="4631166"/>
+                  <a:ext cx="913450" cy="913450"/>
+                </a:xfrm>
+                <a:prstGeom prst="rect">
+                  <a:avLst/>
+                </a:prstGeom>
+                <a:noFill/>
+                <a:ln>
+                  <a:noFill/>
+                </a:ln>
+              </p:spPr>
+            </p:pic>
+            <p:sp>
+              <p:nvSpPr>
+                <p:cNvPr id="42" name="Google Shape;71;p15">
+                  <a:extLst>
+                    <a:ext uri="{FF2B5EF4-FFF2-40B4-BE49-F238E27FC236}">
+                      <a16:creationId xmlns:a16="http://schemas.microsoft.com/office/drawing/2014/main" id="{4BC7F1DD-F931-4AEF-95CF-ACC57C42538D}"/>
+                    </a:ext>
+                  </a:extLst>
+                </p:cNvPr>
+                <p:cNvSpPr txBox="1"/>
+                <p:nvPr/>
+              </p:nvSpPr>
+              <p:spPr>
+                <a:xfrm>
+                  <a:off x="9479724" y="4935316"/>
+                  <a:ext cx="1750800" cy="395400"/>
+                </a:xfrm>
+                <a:prstGeom prst="rect">
+                  <a:avLst/>
+                </a:prstGeom>
+                <a:noFill/>
+                <a:ln>
+                  <a:noFill/>
+                </a:ln>
+              </p:spPr>
+              <p:txBody>
+                <a:bodyPr spcFirstLastPara="1" wrap="square" lIns="91425" tIns="91425" rIns="91425" bIns="91425" anchor="t" anchorCtr="0">
+                  <a:noAutofit/>
+                </a:bodyPr>
+                <a:lstStyle/>
+                <a:p>
+                  <a:pPr marL="0" lvl="0" indent="0" algn="l" rtl="0">
+                    <a:spcBef>
+                      <a:spcPts val="0"/>
+                    </a:spcBef>
+                    <a:spcAft>
+                      <a:spcPts val="0"/>
+                    </a:spcAft>
+                    <a:buNone/>
+                  </a:pPr>
+                  <a:r>
+                    <a:rPr lang="en"/>
+                    <a:t>Sentiment Analysis</a:t>
+                  </a:r>
+                  <a:endParaRPr/>
+                </a:p>
+              </p:txBody>
+            </p:sp>
+            <p:cxnSp>
+              <p:nvCxnSpPr>
+                <p:cNvPr id="43" name="Google Shape;72;p15">
+                  <a:extLst>
+                    <a:ext uri="{FF2B5EF4-FFF2-40B4-BE49-F238E27FC236}">
+                      <a16:creationId xmlns:a16="http://schemas.microsoft.com/office/drawing/2014/main" id="{6DE336B5-C031-45D9-B79F-9A5DD038F1FC}"/>
+                    </a:ext>
+                  </a:extLst>
+                </p:cNvPr>
+                <p:cNvCxnSpPr/>
+                <p:nvPr/>
+              </p:nvCxnSpPr>
+              <p:spPr>
+                <a:xfrm rot="10800000" flipH="1">
+                  <a:off x="9406174" y="4668216"/>
+                  <a:ext cx="199500" cy="199500"/>
+                </a:xfrm>
+                <a:prstGeom prst="straightConnector1">
+                  <a:avLst/>
+                </a:prstGeom>
+                <a:noFill/>
+                <a:ln w="38100" cap="flat" cmpd="sng">
+                  <a:solidFill>
+                    <a:schemeClr val="dk2"/>
+                  </a:solidFill>
+                  <a:prstDash val="solid"/>
+                  <a:round/>
+                  <a:headEnd type="none" w="med" len="med"/>
+                  <a:tailEnd type="none" w="med" len="med"/>
+                </a:ln>
+              </p:spPr>
+            </p:cxnSp>
+            <p:pic>
+              <p:nvPicPr>
+                <p:cNvPr id="44" name="Google Shape;73;p15">
+                  <a:extLst>
+                    <a:ext uri="{FF2B5EF4-FFF2-40B4-BE49-F238E27FC236}">
+                      <a16:creationId xmlns:a16="http://schemas.microsoft.com/office/drawing/2014/main" id="{8BE0F77E-36ED-4712-8E90-259DAD9B9B09}"/>
+                    </a:ext>
+                  </a:extLst>
+                </p:cNvPr>
+                <p:cNvPicPr preferRelativeResize="0"/>
+                <p:nvPr/>
+              </p:nvPicPr>
+              <p:blipFill>
+                <a:blip r:embed="rId6">
+                  <a:alphaModFix/>
+                </a:blip>
+                <a:stretch>
+                  <a:fillRect/>
+                </a:stretch>
+              </p:blipFill>
+              <p:spPr>
+                <a:xfrm>
+                  <a:off x="8978199" y="4962266"/>
+                  <a:ext cx="341500" cy="341500"/>
+                </a:xfrm>
+                <a:prstGeom prst="rect">
+                  <a:avLst/>
+                </a:prstGeom>
+                <a:noFill/>
+                <a:ln>
+                  <a:noFill/>
+                </a:ln>
+              </p:spPr>
+            </p:pic>
+          </p:grpSp>
+          <p:sp>
+            <p:nvSpPr>
+              <p:cNvPr id="45" name="Google Shape;75;p15">
+                <a:extLst>
+                  <a:ext uri="{FF2B5EF4-FFF2-40B4-BE49-F238E27FC236}">
+                    <a16:creationId xmlns:a16="http://schemas.microsoft.com/office/drawing/2014/main" id="{3013BFD1-4A6E-4D3A-B189-874588B03EBB}"/>
+                  </a:ext>
+                </a:extLst>
+              </p:cNvPr>
+              <p:cNvSpPr txBox="1"/>
+              <p:nvPr/>
+            </p:nvSpPr>
+            <p:spPr>
+              <a:xfrm>
+                <a:off x="8553915" y="4158515"/>
+                <a:ext cx="1613825" cy="496800"/>
+              </a:xfrm>
+              <a:prstGeom prst="rect">
+                <a:avLst/>
+              </a:prstGeom>
+              <a:noFill/>
+              <a:ln>
+                <a:noFill/>
+              </a:ln>
+            </p:spPr>
+            <p:txBody>
+              <a:bodyPr spcFirstLastPara="1" wrap="square" lIns="91425" tIns="91425" rIns="91425" bIns="91425" anchor="t" anchorCtr="0">
+                <a:noAutofit/>
+              </a:bodyPr>
+              <a:lstStyle/>
+              <a:p>
+                <a:pPr marL="457200" lvl="0" indent="-317500" algn="l" rtl="0">
+                  <a:spcBef>
+                    <a:spcPts val="0"/>
+                  </a:spcBef>
+                  <a:spcAft>
+                    <a:spcPts val="0"/>
+                  </a:spcAft>
+                  <a:buSzPts val="1400"/>
+                  <a:buChar char="-"/>
+                </a:pPr>
+                <a:r>
+                  <a:rPr lang="en" dirty="0"/>
+                  <a:t>User </a:t>
+                </a:r>
+                <a:endParaRPr dirty="0"/>
+              </a:p>
+              <a:p>
+                <a:pPr marL="457200" lvl="0" indent="-317500" algn="l" rtl="0">
+                  <a:spcBef>
+                    <a:spcPts val="0"/>
+                  </a:spcBef>
+                  <a:spcAft>
+                    <a:spcPts val="0"/>
+                  </a:spcAft>
+                  <a:buSzPts val="1400"/>
+                  <a:buChar char="-"/>
+                </a:pPr>
+                <a:r>
+                  <a:rPr lang="en" dirty="0"/>
+                  <a:t>User Msgs</a:t>
+                </a:r>
+                <a:endParaRPr dirty="0"/>
+              </a:p>
+            </p:txBody>
+          </p:sp>
+          <p:cxnSp>
+            <p:nvCxnSpPr>
+              <p:cNvPr id="48" name="Google Shape;78;p15">
+                <a:extLst>
+                  <a:ext uri="{FF2B5EF4-FFF2-40B4-BE49-F238E27FC236}">
+                    <a16:creationId xmlns:a16="http://schemas.microsoft.com/office/drawing/2014/main" id="{B53E0F95-F4BB-4C54-8D8E-09C295F0C6C7}"/>
+                  </a:ext>
+                </a:extLst>
+              </p:cNvPr>
+              <p:cNvCxnSpPr/>
+              <p:nvPr/>
+            </p:nvCxnSpPr>
+            <p:spPr>
+              <a:xfrm>
+                <a:off x="8086115" y="3726182"/>
+                <a:ext cx="352500" cy="0"/>
+              </a:xfrm>
+              <a:prstGeom prst="straightConnector1">
+                <a:avLst/>
+              </a:prstGeom>
+              <a:noFill/>
+              <a:ln w="38100" cap="flat" cmpd="sng">
+                <a:solidFill>
+                  <a:schemeClr val="dk2"/>
+                </a:solidFill>
+                <a:prstDash val="solid"/>
+                <a:round/>
+                <a:headEnd type="none" w="med" len="med"/>
+                <a:tailEnd type="none" w="med" len="med"/>
+              </a:ln>
+            </p:spPr>
+          </p:cxnSp>
+          <p:sp>
+            <p:nvSpPr>
+              <p:cNvPr id="47" name="Google Shape;77;p15">
+                <a:extLst>
+                  <a:ext uri="{FF2B5EF4-FFF2-40B4-BE49-F238E27FC236}">
+                    <a16:creationId xmlns:a16="http://schemas.microsoft.com/office/drawing/2014/main" id="{69C798D2-662E-4751-915A-8CA34DD80468}"/>
+                  </a:ext>
+                </a:extLst>
+              </p:cNvPr>
+              <p:cNvSpPr txBox="1"/>
+              <p:nvPr/>
+            </p:nvSpPr>
+            <p:spPr>
+              <a:xfrm>
+                <a:off x="2019283" y="3005606"/>
+                <a:ext cx="1265950" cy="572700"/>
               </a:xfrm>
               <a:prstGeom prst="rect">
                 <a:avLst/>
@@ -6176,19 +6614,183 @@
                   <a:buNone/>
                 </a:pPr>
                 <a:r>
-                  <a:rPr lang="en"/>
-                  <a:t>Sentiment Analysis</a:t>
+                  <a:rPr lang="en" dirty="0"/>
+                  <a:t>Users send messages </a:t>
                 </a:r>
-                <a:endParaRPr/>
+                <a:endParaRPr dirty="0"/>
               </a:p>
             </p:txBody>
           </p:sp>
           <p:cxnSp>
             <p:nvCxnSpPr>
-              <p:cNvPr id="43" name="Google Shape;72;p15">
+              <p:cNvPr id="49" name="Google Shape;79;p15">
                 <a:extLst>
                   <a:ext uri="{FF2B5EF4-FFF2-40B4-BE49-F238E27FC236}">
-                    <a16:creationId xmlns:a16="http://schemas.microsoft.com/office/drawing/2014/main" id="{6DE336B5-C031-45D9-B79F-9A5DD038F1FC}"/>
+                    <a16:creationId xmlns:a16="http://schemas.microsoft.com/office/drawing/2014/main" id="{3231922F-35FC-4265-AFBE-B15562F91D9A}"/>
+                  </a:ext>
+                </a:extLst>
+              </p:cNvPr>
+              <p:cNvCxnSpPr>
+                <a:cxnSpLocks/>
+              </p:cNvCxnSpPr>
+              <p:nvPr/>
+            </p:nvCxnSpPr>
+            <p:spPr>
+              <a:xfrm flipV="1">
+                <a:off x="2105757" y="3689204"/>
+                <a:ext cx="1310791" cy="16013"/>
+              </a:xfrm>
+              <a:prstGeom prst="straightConnector1">
+                <a:avLst/>
+              </a:prstGeom>
+              <a:noFill/>
+              <a:ln w="38100" cap="flat" cmpd="sng">
+                <a:solidFill>
+                  <a:schemeClr val="dk2"/>
+                </a:solidFill>
+                <a:prstDash val="solid"/>
+                <a:round/>
+                <a:headEnd type="none" w="med" len="med"/>
+                <a:tailEnd type="none" w="med" len="med"/>
+              </a:ln>
+            </p:spPr>
+          </p:cxnSp>
+          <p:sp>
+            <p:nvSpPr>
+              <p:cNvPr id="51" name="Google Shape;81;p15">
+                <a:extLst>
+                  <a:ext uri="{FF2B5EF4-FFF2-40B4-BE49-F238E27FC236}">
+                    <a16:creationId xmlns:a16="http://schemas.microsoft.com/office/drawing/2014/main" id="{D8145AB6-9100-4C42-9DA7-626ED0949BBE}"/>
+                  </a:ext>
+                </a:extLst>
+              </p:cNvPr>
+              <p:cNvSpPr txBox="1"/>
+              <p:nvPr/>
+            </p:nvSpPr>
+            <p:spPr>
+              <a:xfrm>
+                <a:off x="3527581" y="2477930"/>
+                <a:ext cx="1467299" cy="308400"/>
+              </a:xfrm>
+              <a:prstGeom prst="rect">
+                <a:avLst/>
+              </a:prstGeom>
+              <a:noFill/>
+              <a:ln>
+                <a:noFill/>
+              </a:ln>
+            </p:spPr>
+            <p:txBody>
+              <a:bodyPr spcFirstLastPara="1" wrap="square" lIns="91425" tIns="91425" rIns="91425" bIns="91425" anchor="t" anchorCtr="0">
+                <a:noAutofit/>
+              </a:bodyPr>
+              <a:lstStyle/>
+              <a:p>
+                <a:pPr marL="0" lvl="0" indent="0" algn="l" rtl="0">
+                  <a:spcBef>
+                    <a:spcPts val="0"/>
+                  </a:spcBef>
+                  <a:spcAft>
+                    <a:spcPts val="0"/>
+                  </a:spcAft>
+                  <a:buNone/>
+                </a:pPr>
+                <a:r>
+                  <a:rPr lang="en" dirty="0"/>
+                  <a:t>Chat extension</a:t>
+                </a:r>
+                <a:endParaRPr dirty="0"/>
+              </a:p>
+            </p:txBody>
+          </p:sp>
+          <p:pic>
+            <p:nvPicPr>
+              <p:cNvPr id="52" name="Google Shape;82;p15">
+                <a:extLst>
+                  <a:ext uri="{FF2B5EF4-FFF2-40B4-BE49-F238E27FC236}">
+                    <a16:creationId xmlns:a16="http://schemas.microsoft.com/office/drawing/2014/main" id="{1F86A772-2B6A-49B0-BC46-A753CECDA40E}"/>
+                  </a:ext>
+                </a:extLst>
+              </p:cNvPr>
+              <p:cNvPicPr preferRelativeResize="0"/>
+              <p:nvPr/>
+            </p:nvPicPr>
+            <p:blipFill>
+              <a:blip r:embed="rId7">
+                <a:alphaModFix/>
+              </a:blip>
+              <a:stretch>
+                <a:fillRect/>
+              </a:stretch>
+            </p:blipFill>
+            <p:spPr>
+              <a:xfrm>
+                <a:off x="629083" y="3062905"/>
+                <a:ext cx="1273150" cy="1284623"/>
+              </a:xfrm>
+              <a:prstGeom prst="rect">
+                <a:avLst/>
+              </a:prstGeom>
+              <a:noFill/>
+              <a:ln>
+                <a:noFill/>
+              </a:ln>
+            </p:spPr>
+          </p:pic>
+          <p:sp>
+            <p:nvSpPr>
+              <p:cNvPr id="53" name="Google Shape;83;p15">
+                <a:extLst>
+                  <a:ext uri="{FF2B5EF4-FFF2-40B4-BE49-F238E27FC236}">
+                    <a16:creationId xmlns:a16="http://schemas.microsoft.com/office/drawing/2014/main" id="{289FD935-AFBE-42DB-B8D0-CAE2DA65C3F6}"/>
+                  </a:ext>
+                </a:extLst>
+              </p:cNvPr>
+              <p:cNvSpPr txBox="1"/>
+              <p:nvPr/>
+            </p:nvSpPr>
+            <p:spPr>
+              <a:xfrm>
+                <a:off x="5105916" y="3017991"/>
+                <a:ext cx="1164300" cy="572700"/>
+              </a:xfrm>
+              <a:prstGeom prst="rect">
+                <a:avLst/>
+              </a:prstGeom>
+              <a:noFill/>
+              <a:ln>
+                <a:noFill/>
+              </a:ln>
+            </p:spPr>
+            <p:txBody>
+              <a:bodyPr spcFirstLastPara="1" wrap="square" lIns="91425" tIns="91425" rIns="91425" bIns="91425" anchor="t" anchorCtr="0">
+                <a:noAutofit/>
+              </a:bodyPr>
+              <a:lstStyle/>
+              <a:p>
+                <a:pPr marL="0" lvl="0" indent="0" algn="l" rtl="0">
+                  <a:spcBef>
+                    <a:spcPts val="0"/>
+                  </a:spcBef>
+                  <a:spcAft>
+                    <a:spcPts val="0"/>
+                  </a:spcAft>
+                  <a:buNone/>
+                </a:pPr>
+                <a:r>
+                  <a:rPr lang="en" dirty="0"/>
+                  <a:t>User message </a:t>
+                </a:r>
+                <a:endParaRPr dirty="0"/>
+              </a:p>
+            </p:txBody>
+          </p:sp>
+          <p:cxnSp>
+            <p:nvCxnSpPr>
+              <p:cNvPr id="54" name="Google Shape;84;p15">
+                <a:extLst>
+                  <a:ext uri="{FF2B5EF4-FFF2-40B4-BE49-F238E27FC236}">
+                    <a16:creationId xmlns:a16="http://schemas.microsoft.com/office/drawing/2014/main" id="{8EE037B5-C3A1-4FA0-8938-BF72AF022609}"/>
                   </a:ext>
                 </a:extLst>
               </p:cNvPr>
@@ -6197,8 +6799,8 @@
             </p:nvCxnSpPr>
             <p:spPr>
               <a:xfrm rot="10800000" flipH="1">
-                <a:off x="9406174" y="4668216"/>
-                <a:ext cx="199500" cy="199500"/>
+                <a:off x="5179991" y="3705216"/>
+                <a:ext cx="1086000" cy="17700"/>
               </a:xfrm>
               <a:prstGeom prst="straightConnector1">
                 <a:avLst/>
@@ -6217,28 +6819,27 @@
           </p:cxnSp>
           <p:pic>
             <p:nvPicPr>
-              <p:cNvPr id="44" name="Google Shape;73;p15">
+              <p:cNvPr id="60" name="Google Shape;74;p15">
                 <a:extLst>
                   <a:ext uri="{FF2B5EF4-FFF2-40B4-BE49-F238E27FC236}">
-                    <a16:creationId xmlns:a16="http://schemas.microsoft.com/office/drawing/2014/main" id="{8BE0F77E-36ED-4712-8E90-259DAD9B9B09}"/>
+                    <a16:creationId xmlns:a16="http://schemas.microsoft.com/office/drawing/2014/main" id="{93D9986E-E13D-4B2C-9440-8F9BCE2E3A88}"/>
                   </a:ext>
                 </a:extLst>
               </p:cNvPr>
               <p:cNvPicPr preferRelativeResize="0"/>
               <p:nvPr/>
             </p:nvPicPr>
-            <p:blipFill>
-              <a:blip r:embed="rId6">
+            <p:blipFill rotWithShape="1">
+              <a:blip r:embed="rId8">
                 <a:alphaModFix/>
               </a:blip>
-              <a:stretch>
-                <a:fillRect/>
-              </a:stretch>
+              <a:srcRect l="27086" t="26336" r="26402" b="24086"/>
+              <a:stretch/>
             </p:blipFill>
             <p:spPr>
               <a:xfrm>
-                <a:off x="8978199" y="4962266"/>
-                <a:ext cx="341500" cy="341500"/>
+                <a:off x="8685830" y="3139756"/>
+                <a:ext cx="1110103" cy="1098896"/>
               </a:xfrm>
               <a:prstGeom prst="rect">
                 <a:avLst/>
@@ -6250,381 +6851,6 @@
             </p:spPr>
           </p:pic>
         </p:grpSp>
-        <p:sp>
-          <p:nvSpPr>
-            <p:cNvPr id="45" name="Google Shape;75;p15">
-              <a:extLst>
-                <a:ext uri="{FF2B5EF4-FFF2-40B4-BE49-F238E27FC236}">
-                  <a16:creationId xmlns:a16="http://schemas.microsoft.com/office/drawing/2014/main" id="{3013BFD1-4A6E-4D3A-B189-874588B03EBB}"/>
-                </a:ext>
-              </a:extLst>
-            </p:cNvPr>
-            <p:cNvSpPr txBox="1"/>
-            <p:nvPr/>
-          </p:nvSpPr>
-          <p:spPr>
-            <a:xfrm>
-              <a:off x="8553915" y="4158515"/>
-              <a:ext cx="1613825" cy="496800"/>
-            </a:xfrm>
-            <a:prstGeom prst="rect">
-              <a:avLst/>
-            </a:prstGeom>
-            <a:noFill/>
-            <a:ln>
-              <a:noFill/>
-            </a:ln>
-          </p:spPr>
-          <p:txBody>
-            <a:bodyPr spcFirstLastPara="1" wrap="square" lIns="91425" tIns="91425" rIns="91425" bIns="91425" anchor="t" anchorCtr="0">
-              <a:noAutofit/>
-            </a:bodyPr>
-            <a:lstStyle/>
-            <a:p>
-              <a:pPr marL="457200" lvl="0" indent="-317500" algn="l" rtl="0">
-                <a:spcBef>
-                  <a:spcPts val="0"/>
-                </a:spcBef>
-                <a:spcAft>
-                  <a:spcPts val="0"/>
-                </a:spcAft>
-                <a:buSzPts val="1400"/>
-                <a:buChar char="-"/>
-              </a:pPr>
-              <a:r>
-                <a:rPr lang="en" dirty="0"/>
-                <a:t>User </a:t>
-              </a:r>
-              <a:endParaRPr dirty="0"/>
-            </a:p>
-            <a:p>
-              <a:pPr marL="457200" lvl="0" indent="-317500" algn="l" rtl="0">
-                <a:spcBef>
-                  <a:spcPts val="0"/>
-                </a:spcBef>
-                <a:spcAft>
-                  <a:spcPts val="0"/>
-                </a:spcAft>
-                <a:buSzPts val="1400"/>
-                <a:buChar char="-"/>
-              </a:pPr>
-              <a:r>
-                <a:rPr lang="en" dirty="0"/>
-                <a:t>User Msgs</a:t>
-              </a:r>
-              <a:endParaRPr dirty="0"/>
-            </a:p>
-          </p:txBody>
-        </p:sp>
-        <p:cxnSp>
-          <p:nvCxnSpPr>
-            <p:cNvPr id="48" name="Google Shape;78;p15">
-              <a:extLst>
-                <a:ext uri="{FF2B5EF4-FFF2-40B4-BE49-F238E27FC236}">
-                  <a16:creationId xmlns:a16="http://schemas.microsoft.com/office/drawing/2014/main" id="{B53E0F95-F4BB-4C54-8D8E-09C295F0C6C7}"/>
-                </a:ext>
-              </a:extLst>
-            </p:cNvPr>
-            <p:cNvCxnSpPr/>
-            <p:nvPr/>
-          </p:nvCxnSpPr>
-          <p:spPr>
-            <a:xfrm>
-              <a:off x="8086115" y="3726182"/>
-              <a:ext cx="352500" cy="0"/>
-            </a:xfrm>
-            <a:prstGeom prst="straightConnector1">
-              <a:avLst/>
-            </a:prstGeom>
-            <a:noFill/>
-            <a:ln w="38100" cap="flat" cmpd="sng">
-              <a:solidFill>
-                <a:schemeClr val="dk2"/>
-              </a:solidFill>
-              <a:prstDash val="solid"/>
-              <a:round/>
-              <a:headEnd type="none" w="med" len="med"/>
-              <a:tailEnd type="none" w="med" len="med"/>
-            </a:ln>
-          </p:spPr>
-        </p:cxnSp>
-        <p:sp>
-          <p:nvSpPr>
-            <p:cNvPr id="47" name="Google Shape;77;p15">
-              <a:extLst>
-                <a:ext uri="{FF2B5EF4-FFF2-40B4-BE49-F238E27FC236}">
-                  <a16:creationId xmlns:a16="http://schemas.microsoft.com/office/drawing/2014/main" id="{69C798D2-662E-4751-915A-8CA34DD80468}"/>
-                </a:ext>
-              </a:extLst>
-            </p:cNvPr>
-            <p:cNvSpPr txBox="1"/>
-            <p:nvPr/>
-          </p:nvSpPr>
-          <p:spPr>
-            <a:xfrm>
-              <a:off x="2019283" y="3005606"/>
-              <a:ext cx="1265950" cy="572700"/>
-            </a:xfrm>
-            <a:prstGeom prst="rect">
-              <a:avLst/>
-            </a:prstGeom>
-            <a:noFill/>
-            <a:ln>
-              <a:noFill/>
-            </a:ln>
-          </p:spPr>
-          <p:txBody>
-            <a:bodyPr spcFirstLastPara="1" wrap="square" lIns="91425" tIns="91425" rIns="91425" bIns="91425" anchor="t" anchorCtr="0">
-              <a:noAutofit/>
-            </a:bodyPr>
-            <a:lstStyle/>
-            <a:p>
-              <a:pPr marL="0" lvl="0" indent="0" algn="l" rtl="0">
-                <a:spcBef>
-                  <a:spcPts val="0"/>
-                </a:spcBef>
-                <a:spcAft>
-                  <a:spcPts val="0"/>
-                </a:spcAft>
-                <a:buNone/>
-              </a:pPr>
-              <a:r>
-                <a:rPr lang="en" dirty="0"/>
-                <a:t>Users send messages </a:t>
-              </a:r>
-              <a:endParaRPr dirty="0"/>
-            </a:p>
-          </p:txBody>
-        </p:sp>
-        <p:cxnSp>
-          <p:nvCxnSpPr>
-            <p:cNvPr id="49" name="Google Shape;79;p15">
-              <a:extLst>
-                <a:ext uri="{FF2B5EF4-FFF2-40B4-BE49-F238E27FC236}">
-                  <a16:creationId xmlns:a16="http://schemas.microsoft.com/office/drawing/2014/main" id="{3231922F-35FC-4265-AFBE-B15562F91D9A}"/>
-                </a:ext>
-              </a:extLst>
-            </p:cNvPr>
-            <p:cNvCxnSpPr>
-              <a:cxnSpLocks/>
-            </p:cNvCxnSpPr>
-            <p:nvPr/>
-          </p:nvCxnSpPr>
-          <p:spPr>
-            <a:xfrm flipV="1">
-              <a:off x="2105757" y="3689204"/>
-              <a:ext cx="1310791" cy="16013"/>
-            </a:xfrm>
-            <a:prstGeom prst="straightConnector1">
-              <a:avLst/>
-            </a:prstGeom>
-            <a:noFill/>
-            <a:ln w="38100" cap="flat" cmpd="sng">
-              <a:solidFill>
-                <a:schemeClr val="dk2"/>
-              </a:solidFill>
-              <a:prstDash val="solid"/>
-              <a:round/>
-              <a:headEnd type="none" w="med" len="med"/>
-              <a:tailEnd type="none" w="med" len="med"/>
-            </a:ln>
-          </p:spPr>
-        </p:cxnSp>
-        <p:sp>
-          <p:nvSpPr>
-            <p:cNvPr id="51" name="Google Shape;81;p15">
-              <a:extLst>
-                <a:ext uri="{FF2B5EF4-FFF2-40B4-BE49-F238E27FC236}">
-                  <a16:creationId xmlns:a16="http://schemas.microsoft.com/office/drawing/2014/main" id="{D8145AB6-9100-4C42-9DA7-626ED0949BBE}"/>
-                </a:ext>
-              </a:extLst>
-            </p:cNvPr>
-            <p:cNvSpPr txBox="1"/>
-            <p:nvPr/>
-          </p:nvSpPr>
-          <p:spPr>
-            <a:xfrm>
-              <a:off x="3527581" y="2477930"/>
-              <a:ext cx="1467299" cy="308400"/>
-            </a:xfrm>
-            <a:prstGeom prst="rect">
-              <a:avLst/>
-            </a:prstGeom>
-            <a:noFill/>
-            <a:ln>
-              <a:noFill/>
-            </a:ln>
-          </p:spPr>
-          <p:txBody>
-            <a:bodyPr spcFirstLastPara="1" wrap="square" lIns="91425" tIns="91425" rIns="91425" bIns="91425" anchor="t" anchorCtr="0">
-              <a:noAutofit/>
-            </a:bodyPr>
-            <a:lstStyle/>
-            <a:p>
-              <a:pPr marL="0" lvl="0" indent="0" algn="l" rtl="0">
-                <a:spcBef>
-                  <a:spcPts val="0"/>
-                </a:spcBef>
-                <a:spcAft>
-                  <a:spcPts val="0"/>
-                </a:spcAft>
-                <a:buNone/>
-              </a:pPr>
-              <a:r>
-                <a:rPr lang="en" dirty="0"/>
-                <a:t>Chat extension</a:t>
-              </a:r>
-              <a:endParaRPr dirty="0"/>
-            </a:p>
-          </p:txBody>
-        </p:sp>
-        <p:pic>
-          <p:nvPicPr>
-            <p:cNvPr id="52" name="Google Shape;82;p15">
-              <a:extLst>
-                <a:ext uri="{FF2B5EF4-FFF2-40B4-BE49-F238E27FC236}">
-                  <a16:creationId xmlns:a16="http://schemas.microsoft.com/office/drawing/2014/main" id="{1F86A772-2B6A-49B0-BC46-A753CECDA40E}"/>
-                </a:ext>
-              </a:extLst>
-            </p:cNvPr>
-            <p:cNvPicPr preferRelativeResize="0"/>
-            <p:nvPr/>
-          </p:nvPicPr>
-          <p:blipFill>
-            <a:blip r:embed="rId7">
-              <a:alphaModFix/>
-            </a:blip>
-            <a:stretch>
-              <a:fillRect/>
-            </a:stretch>
-          </p:blipFill>
-          <p:spPr>
-            <a:xfrm>
-              <a:off x="629083" y="3062905"/>
-              <a:ext cx="1273150" cy="1284623"/>
-            </a:xfrm>
-            <a:prstGeom prst="rect">
-              <a:avLst/>
-            </a:prstGeom>
-            <a:noFill/>
-            <a:ln>
-              <a:noFill/>
-            </a:ln>
-          </p:spPr>
-        </p:pic>
-        <p:sp>
-          <p:nvSpPr>
-            <p:cNvPr id="53" name="Google Shape;83;p15">
-              <a:extLst>
-                <a:ext uri="{FF2B5EF4-FFF2-40B4-BE49-F238E27FC236}">
-                  <a16:creationId xmlns:a16="http://schemas.microsoft.com/office/drawing/2014/main" id="{289FD935-AFBE-42DB-B8D0-CAE2DA65C3F6}"/>
-                </a:ext>
-              </a:extLst>
-            </p:cNvPr>
-            <p:cNvSpPr txBox="1"/>
-            <p:nvPr/>
-          </p:nvSpPr>
-          <p:spPr>
-            <a:xfrm>
-              <a:off x="5105916" y="3017991"/>
-              <a:ext cx="1164300" cy="572700"/>
-            </a:xfrm>
-            <a:prstGeom prst="rect">
-              <a:avLst/>
-            </a:prstGeom>
-            <a:noFill/>
-            <a:ln>
-              <a:noFill/>
-            </a:ln>
-          </p:spPr>
-          <p:txBody>
-            <a:bodyPr spcFirstLastPara="1" wrap="square" lIns="91425" tIns="91425" rIns="91425" bIns="91425" anchor="t" anchorCtr="0">
-              <a:noAutofit/>
-            </a:bodyPr>
-            <a:lstStyle/>
-            <a:p>
-              <a:pPr marL="0" lvl="0" indent="0" algn="l" rtl="0">
-                <a:spcBef>
-                  <a:spcPts val="0"/>
-                </a:spcBef>
-                <a:spcAft>
-                  <a:spcPts val="0"/>
-                </a:spcAft>
-                <a:buNone/>
-              </a:pPr>
-              <a:r>
-                <a:rPr lang="en" dirty="0"/>
-                <a:t>User message </a:t>
-              </a:r>
-              <a:endParaRPr dirty="0"/>
-            </a:p>
-          </p:txBody>
-        </p:sp>
-        <p:cxnSp>
-          <p:nvCxnSpPr>
-            <p:cNvPr id="54" name="Google Shape;84;p15">
-              <a:extLst>
-                <a:ext uri="{FF2B5EF4-FFF2-40B4-BE49-F238E27FC236}">
-                  <a16:creationId xmlns:a16="http://schemas.microsoft.com/office/drawing/2014/main" id="{8EE037B5-C3A1-4FA0-8938-BF72AF022609}"/>
-                </a:ext>
-              </a:extLst>
-            </p:cNvPr>
-            <p:cNvCxnSpPr/>
-            <p:nvPr/>
-          </p:nvCxnSpPr>
-          <p:spPr>
-            <a:xfrm rot="10800000" flipH="1">
-              <a:off x="5179991" y="3705216"/>
-              <a:ext cx="1086000" cy="17700"/>
-            </a:xfrm>
-            <a:prstGeom prst="straightConnector1">
-              <a:avLst/>
-            </a:prstGeom>
-            <a:noFill/>
-            <a:ln w="38100" cap="flat" cmpd="sng">
-              <a:solidFill>
-                <a:schemeClr val="dk2"/>
-              </a:solidFill>
-              <a:prstDash val="solid"/>
-              <a:round/>
-              <a:headEnd type="none" w="med" len="med"/>
-              <a:tailEnd type="none" w="med" len="med"/>
-            </a:ln>
-          </p:spPr>
-        </p:cxnSp>
-        <p:pic>
-          <p:nvPicPr>
-            <p:cNvPr id="60" name="Google Shape;74;p15">
-              <a:extLst>
-                <a:ext uri="{FF2B5EF4-FFF2-40B4-BE49-F238E27FC236}">
-                  <a16:creationId xmlns:a16="http://schemas.microsoft.com/office/drawing/2014/main" id="{93D9986E-E13D-4B2C-9440-8F9BCE2E3A88}"/>
-                </a:ext>
-              </a:extLst>
-            </p:cNvPr>
-            <p:cNvPicPr preferRelativeResize="0"/>
-            <p:nvPr/>
-          </p:nvPicPr>
-          <p:blipFill rotWithShape="1">
-            <a:blip r:embed="rId8">
-              <a:alphaModFix/>
-            </a:blip>
-            <a:srcRect l="27086" t="26336" r="26402" b="24086"/>
-            <a:stretch/>
-          </p:blipFill>
-          <p:spPr>
-            <a:xfrm>
-              <a:off x="8685830" y="3139756"/>
-              <a:ext cx="1110103" cy="1098896"/>
-            </a:xfrm>
-            <a:prstGeom prst="rect">
-              <a:avLst/>
-            </a:prstGeom>
-            <a:noFill/>
-            <a:ln>
-              <a:noFill/>
-            </a:ln>
-          </p:spPr>
-        </p:pic>
       </p:grpSp>
     </p:spTree>
     <p:extLst>
@@ -6725,7 +6951,7 @@
           <p:nvPr/>
         </p:nvPicPr>
         <p:blipFill>
-          <a:blip r:embed="rId3">
+          <a:blip r:embed="rId3" cstate="print">
             <a:extLst>
               <a:ext uri="{28A0092B-C50C-407E-A947-70E740481C1C}">
                 <a14:useLocalDpi xmlns:a14="http://schemas.microsoft.com/office/drawing/2010/main" val="0"/>
@@ -7309,7 +7535,7 @@
           <p:nvPr/>
         </p:nvPicPr>
         <p:blipFill>
-          <a:blip r:embed="rId5">
+          <a:blip r:embed="rId5" cstate="print">
             <a:extLst>
               <a:ext uri="{28A0092B-C50C-407E-A947-70E740481C1C}">
                 <a14:useLocalDpi xmlns:a14="http://schemas.microsoft.com/office/drawing/2010/main" val="0"/>
@@ -7901,9 +8127,12 @@
 </file>
 
 <file path=customXml/item1.xml><?xml version="1.0" encoding="utf-8"?>
-<p:properties xmlns:p="http://schemas.microsoft.com/office/2006/metadata/properties" xmlns:xsi="http://www.w3.org/2001/XMLSchema-instance" xmlns:pc="http://schemas.microsoft.com/office/infopath/2007/PartnerControls">
-  <documentManagement/>
-</p:properties>
+<?mso-contentType ?>
+<FormTemplates xmlns="http://schemas.microsoft.com/sharepoint/v3/contenttype/forms">
+  <Display>DocumentLibraryForm</Display>
+  <Edit>DocumentLibraryForm</Edit>
+  <New>DocumentLibraryForm</New>
+</FormTemplates>
 </file>
 
 <file path=customXml/item2.xml><?xml version="1.0" encoding="utf-8"?>
@@ -8039,19 +8268,15 @@
 </file>
 
 <file path=customXml/item3.xml><?xml version="1.0" encoding="utf-8"?>
-<?mso-contentType ?>
-<FormTemplates xmlns="http://schemas.microsoft.com/sharepoint/v3/contenttype/forms">
-  <Display>DocumentLibraryForm</Display>
-  <Edit>DocumentLibraryForm</Edit>
-  <New>DocumentLibraryForm</New>
-</FormTemplates>
+<p:properties xmlns:p="http://schemas.microsoft.com/office/2006/metadata/properties" xmlns:xsi="http://www.w3.org/2001/XMLSchema-instance" xmlns:pc="http://schemas.microsoft.com/office/infopath/2007/PartnerControls">
+  <documentManagement/>
+</p:properties>
 </file>
 
 <file path=customXml/itemProps1.xml><?xml version="1.0" encoding="utf-8"?>
-<ds:datastoreItem xmlns:ds="http://schemas.openxmlformats.org/officeDocument/2006/customXml" ds:itemID="{A6050DCD-EB4A-4BE1-AF05-D12EB61D7B26}">
+<ds:datastoreItem xmlns:ds="http://schemas.openxmlformats.org/officeDocument/2006/customXml" ds:itemID="{5E0B0DA8-D6CD-4DCE-B537-41D983C0EE34}">
   <ds:schemaRefs>
-    <ds:schemaRef ds:uri="http://schemas.microsoft.com/office/2006/metadata/properties"/>
-    <ds:schemaRef ds:uri="http://schemas.microsoft.com/office/infopath/2007/PartnerControls"/>
+    <ds:schemaRef ds:uri="http://schemas.microsoft.com/sharepoint/v3/contenttype/forms"/>
   </ds:schemaRefs>
 </ds:datastoreItem>
 </file>
@@ -8075,9 +8300,10 @@
 </file>
 
 <file path=customXml/itemProps3.xml><?xml version="1.0" encoding="utf-8"?>
-<ds:datastoreItem xmlns:ds="http://schemas.openxmlformats.org/officeDocument/2006/customXml" ds:itemID="{5E0B0DA8-D6CD-4DCE-B537-41D983C0EE34}">
+<ds:datastoreItem xmlns:ds="http://schemas.openxmlformats.org/officeDocument/2006/customXml" ds:itemID="{A6050DCD-EB4A-4BE1-AF05-D12EB61D7B26}">
   <ds:schemaRefs>
-    <ds:schemaRef ds:uri="http://schemas.microsoft.com/sharepoint/v3/contenttype/forms"/>
+    <ds:schemaRef ds:uri="http://schemas.microsoft.com/office/2006/metadata/properties"/>
+    <ds:schemaRef ds:uri="http://schemas.microsoft.com/office/infopath/2007/PartnerControls"/>
   </ds:schemaRefs>
 </ds:datastoreItem>
 </file>
</xml_diff>